<commit_message>
updated readme with http monitor examples
</commit_message>
<xml_diff>
--- a/images/jenkins library readme images.pptx
+++ b/images/jenkins library readme images.pptx
@@ -106,6 +106,11 @@
       </a:defRPr>
     </a:lvl9pPr>
   </p:defaultTextStyle>
+  <p:extLst>
+    <p:ext uri="{EFAFB233-063F-42B5-8137-9DF3F51BA10A}">
+      <p15:sldGuideLst xmlns:p15="http://schemas.microsoft.com/office/powerpoint/2012/main"/>
+    </p:ext>
+  </p:extLst>
 </p:presentation>
 </file>
 
@@ -3623,6 +3628,66 @@
           <a:chExt cx="0" cy="0"/>
         </a:xfrm>
       </p:grpSpPr>
+      <p:pic>
+        <p:nvPicPr>
+          <p:cNvPr id="2" name="Picture 1">
+            <a:extLst>
+              <a:ext uri="{FF2B5EF4-FFF2-40B4-BE49-F238E27FC236}">
+                <a16:creationId xmlns:a16="http://schemas.microsoft.com/office/drawing/2014/main" id="{DE99A44B-5C20-8441-9CB2-D2120060965F}"/>
+              </a:ext>
+            </a:extLst>
+          </p:cNvPr>
+          <p:cNvPicPr>
+            <a:picLocks noChangeAspect="1"/>
+          </p:cNvPicPr>
+          <p:nvPr/>
+        </p:nvPicPr>
+        <p:blipFill>
+          <a:blip r:embed="rId2"/>
+          <a:stretch>
+            <a:fillRect/>
+          </a:stretch>
+        </p:blipFill>
+        <p:spPr>
+          <a:xfrm>
+            <a:off x="782339" y="444803"/>
+            <a:ext cx="3675361" cy="2603197"/>
+          </a:xfrm>
+          <a:prstGeom prst="rect">
+            <a:avLst/>
+          </a:prstGeom>
+        </p:spPr>
+      </p:pic>
+      <p:pic>
+        <p:nvPicPr>
+          <p:cNvPr id="3" name="Picture 2">
+            <a:extLst>
+              <a:ext uri="{FF2B5EF4-FFF2-40B4-BE49-F238E27FC236}">
+                <a16:creationId xmlns:a16="http://schemas.microsoft.com/office/drawing/2014/main" id="{C31B0C94-0DBF-AE45-8AE2-617C010854F0}"/>
+              </a:ext>
+            </a:extLst>
+          </p:cNvPr>
+          <p:cNvPicPr>
+            <a:picLocks noChangeAspect="1"/>
+          </p:cNvPicPr>
+          <p:nvPr/>
+        </p:nvPicPr>
+        <p:blipFill>
+          <a:blip r:embed="rId3"/>
+          <a:stretch>
+            <a:fillRect/>
+          </a:stretch>
+        </p:blipFill>
+        <p:spPr>
+          <a:xfrm>
+            <a:off x="5008340" y="444802"/>
+            <a:ext cx="5837736" cy="2603198"/>
+          </a:xfrm>
+          <a:prstGeom prst="rect">
+            <a:avLst/>
+          </a:prstGeom>
+        </p:spPr>
+      </p:pic>
     </p:spTree>
     <p:extLst>
       <p:ext uri="{BB962C8B-B14F-4D97-AF65-F5344CB8AC3E}">

</xml_diff>

<commit_message>
Adjust docs and examples to use global credentials
</commit_message>
<xml_diff>
--- a/images/jenkins library readme images.pptx
+++ b/images/jenkins library readme images.pptx
@@ -8,6 +8,7 @@
     <p:sldId id="256" r:id="rId2"/>
     <p:sldId id="257" r:id="rId3"/>
     <p:sldId id="258" r:id="rId4"/>
+    <p:sldId id="259" r:id="rId5"/>
   </p:sldIdLst>
   <p:sldSz cx="12192000" cy="6858000"/>
   <p:notesSz cx="6858000" cy="9144000"/>
@@ -261,7 +262,7 @@
           <a:p>
             <a:fld id="{E1365ACA-08A2-A04C-80CB-68DC66F31BF2}" type="datetimeFigureOut">
               <a:rPr lang="en-US" smtClean="0"/>
-              <a:t>10/21/20</a:t>
+              <a:t>10/26/20</a:t>
             </a:fld>
             <a:endParaRPr lang="en-US"/>
           </a:p>
@@ -459,7 +460,7 @@
           <a:p>
             <a:fld id="{E1365ACA-08A2-A04C-80CB-68DC66F31BF2}" type="datetimeFigureOut">
               <a:rPr lang="en-US" smtClean="0"/>
-              <a:t>10/21/20</a:t>
+              <a:t>10/26/20</a:t>
             </a:fld>
             <a:endParaRPr lang="en-US"/>
           </a:p>
@@ -667,7 +668,7 @@
           <a:p>
             <a:fld id="{E1365ACA-08A2-A04C-80CB-68DC66F31BF2}" type="datetimeFigureOut">
               <a:rPr lang="en-US" smtClean="0"/>
-              <a:t>10/21/20</a:t>
+              <a:t>10/26/20</a:t>
             </a:fld>
             <a:endParaRPr lang="en-US"/>
           </a:p>
@@ -865,7 +866,7 @@
           <a:p>
             <a:fld id="{E1365ACA-08A2-A04C-80CB-68DC66F31BF2}" type="datetimeFigureOut">
               <a:rPr lang="en-US" smtClean="0"/>
-              <a:t>10/21/20</a:t>
+              <a:t>10/26/20</a:t>
             </a:fld>
             <a:endParaRPr lang="en-US"/>
           </a:p>
@@ -1140,7 +1141,7 @@
           <a:p>
             <a:fld id="{E1365ACA-08A2-A04C-80CB-68DC66F31BF2}" type="datetimeFigureOut">
               <a:rPr lang="en-US" smtClean="0"/>
-              <a:t>10/21/20</a:t>
+              <a:t>10/26/20</a:t>
             </a:fld>
             <a:endParaRPr lang="en-US"/>
           </a:p>
@@ -1405,7 +1406,7 @@
           <a:p>
             <a:fld id="{E1365ACA-08A2-A04C-80CB-68DC66F31BF2}" type="datetimeFigureOut">
               <a:rPr lang="en-US" smtClean="0"/>
-              <a:t>10/21/20</a:t>
+              <a:t>10/26/20</a:t>
             </a:fld>
             <a:endParaRPr lang="en-US"/>
           </a:p>
@@ -1817,7 +1818,7 @@
           <a:p>
             <a:fld id="{E1365ACA-08A2-A04C-80CB-68DC66F31BF2}" type="datetimeFigureOut">
               <a:rPr lang="en-US" smtClean="0"/>
-              <a:t>10/21/20</a:t>
+              <a:t>10/26/20</a:t>
             </a:fld>
             <a:endParaRPr lang="en-US"/>
           </a:p>
@@ -1958,7 +1959,7 @@
           <a:p>
             <a:fld id="{E1365ACA-08A2-A04C-80CB-68DC66F31BF2}" type="datetimeFigureOut">
               <a:rPr lang="en-US" smtClean="0"/>
-              <a:t>10/21/20</a:t>
+              <a:t>10/26/20</a:t>
             </a:fld>
             <a:endParaRPr lang="en-US"/>
           </a:p>
@@ -2071,7 +2072,7 @@
           <a:p>
             <a:fld id="{E1365ACA-08A2-A04C-80CB-68DC66F31BF2}" type="datetimeFigureOut">
               <a:rPr lang="en-US" smtClean="0"/>
-              <a:t>10/21/20</a:t>
+              <a:t>10/26/20</a:t>
             </a:fld>
             <a:endParaRPr lang="en-US"/>
           </a:p>
@@ -2382,7 +2383,7 @@
           <a:p>
             <a:fld id="{E1365ACA-08A2-A04C-80CB-68DC66F31BF2}" type="datetimeFigureOut">
               <a:rPr lang="en-US" smtClean="0"/>
-              <a:t>10/21/20</a:t>
+              <a:t>10/26/20</a:t>
             </a:fld>
             <a:endParaRPr lang="en-US"/>
           </a:p>
@@ -2670,7 +2671,7 @@
           <a:p>
             <a:fld id="{E1365ACA-08A2-A04C-80CB-68DC66F31BF2}" type="datetimeFigureOut">
               <a:rPr lang="en-US" smtClean="0"/>
-              <a:t>10/21/20</a:t>
+              <a:t>10/26/20</a:t>
             </a:fld>
             <a:endParaRPr lang="en-US"/>
           </a:p>
@@ -2911,7 +2912,7 @@
           <a:p>
             <a:fld id="{E1365ACA-08A2-A04C-80CB-68DC66F31BF2}" type="datetimeFigureOut">
               <a:rPr lang="en-US" smtClean="0"/>
-              <a:t>10/21/20</a:t>
+              <a:t>10/26/20</a:t>
             </a:fld>
             <a:endParaRPr lang="en-US"/>
           </a:p>
@@ -3701,6 +3702,610 @@
 </p:sld>
 </file>
 
+<file path=ppt/slides/slide4.xml><?xml version="1.0" encoding="utf-8"?>
+<p:sld xmlns:a="http://schemas.openxmlformats.org/drawingml/2006/main" xmlns:r="http://schemas.openxmlformats.org/officeDocument/2006/relationships" xmlns:p="http://schemas.openxmlformats.org/presentationml/2006/main">
+  <p:cSld>
+    <p:spTree>
+      <p:nvGrpSpPr>
+        <p:cNvPr id="1" name=""/>
+        <p:cNvGrpSpPr/>
+        <p:nvPr/>
+      </p:nvGrpSpPr>
+      <p:grpSpPr>
+        <a:xfrm>
+          <a:off x="0" y="0"/>
+          <a:ext cx="0" cy="0"/>
+          <a:chOff x="0" y="0"/>
+          <a:chExt cx="0" cy="0"/>
+        </a:xfrm>
+      </p:grpSpPr>
+      <p:pic>
+        <p:nvPicPr>
+          <p:cNvPr id="4" name="Picture 3">
+            <a:extLst>
+              <a:ext uri="{FF2B5EF4-FFF2-40B4-BE49-F238E27FC236}">
+                <a16:creationId xmlns:a16="http://schemas.microsoft.com/office/drawing/2014/main" id="{3FF714DB-555A-C645-9A41-0FF0DDBDEF7C}"/>
+              </a:ext>
+            </a:extLst>
+          </p:cNvPr>
+          <p:cNvPicPr>
+            <a:picLocks noChangeAspect="1"/>
+          </p:cNvPicPr>
+          <p:nvPr/>
+        </p:nvPicPr>
+        <p:blipFill>
+          <a:blip r:embed="rId2"/>
+          <a:stretch>
+            <a:fillRect/>
+          </a:stretch>
+        </p:blipFill>
+        <p:spPr>
+          <a:xfrm>
+            <a:off x="766369" y="4674296"/>
+            <a:ext cx="6813176" cy="2000997"/>
+          </a:xfrm>
+          <a:prstGeom prst="rect">
+            <a:avLst/>
+          </a:prstGeom>
+        </p:spPr>
+      </p:pic>
+      <p:pic>
+        <p:nvPicPr>
+          <p:cNvPr id="5" name="Picture 4">
+            <a:extLst>
+              <a:ext uri="{FF2B5EF4-FFF2-40B4-BE49-F238E27FC236}">
+                <a16:creationId xmlns:a16="http://schemas.microsoft.com/office/drawing/2014/main" id="{070A60B1-34FE-F949-8C66-6D669DBE7633}"/>
+              </a:ext>
+            </a:extLst>
+          </p:cNvPr>
+          <p:cNvPicPr>
+            <a:picLocks noChangeAspect="1"/>
+          </p:cNvPicPr>
+          <p:nvPr/>
+        </p:nvPicPr>
+        <p:blipFill>
+          <a:blip r:embed="rId3"/>
+          <a:stretch>
+            <a:fillRect/>
+          </a:stretch>
+        </p:blipFill>
+        <p:spPr>
+          <a:xfrm>
+            <a:off x="2758149" y="807096"/>
+            <a:ext cx="3535639" cy="1108938"/>
+          </a:xfrm>
+          <a:prstGeom prst="rect">
+            <a:avLst/>
+          </a:prstGeom>
+        </p:spPr>
+      </p:pic>
+      <p:pic>
+        <p:nvPicPr>
+          <p:cNvPr id="6" name="Picture 5">
+            <a:extLst>
+              <a:ext uri="{FF2B5EF4-FFF2-40B4-BE49-F238E27FC236}">
+                <a16:creationId xmlns:a16="http://schemas.microsoft.com/office/drawing/2014/main" id="{D2BFADD3-953C-6342-88AB-E2D56A172D26}"/>
+              </a:ext>
+            </a:extLst>
+          </p:cNvPr>
+          <p:cNvPicPr>
+            <a:picLocks noChangeAspect="1"/>
+          </p:cNvPicPr>
+          <p:nvPr/>
+        </p:nvPicPr>
+        <p:blipFill>
+          <a:blip r:embed="rId4"/>
+          <a:stretch>
+            <a:fillRect/>
+          </a:stretch>
+        </p:blipFill>
+        <p:spPr>
+          <a:xfrm>
+            <a:off x="8056624" y="1581471"/>
+            <a:ext cx="3816053" cy="2505635"/>
+          </a:xfrm>
+          <a:prstGeom prst="rect">
+            <a:avLst/>
+          </a:prstGeom>
+        </p:spPr>
+      </p:pic>
+      <p:pic>
+        <p:nvPicPr>
+          <p:cNvPr id="8" name="Picture 7">
+            <a:extLst>
+              <a:ext uri="{FF2B5EF4-FFF2-40B4-BE49-F238E27FC236}">
+                <a16:creationId xmlns:a16="http://schemas.microsoft.com/office/drawing/2014/main" id="{3DA80684-2D34-C742-985D-4378901D8A93}"/>
+              </a:ext>
+            </a:extLst>
+          </p:cNvPr>
+          <p:cNvPicPr>
+            <a:picLocks noChangeAspect="1"/>
+          </p:cNvPicPr>
+          <p:nvPr/>
+        </p:nvPicPr>
+        <p:blipFill>
+          <a:blip r:embed="rId5"/>
+          <a:stretch>
+            <a:fillRect/>
+          </a:stretch>
+        </p:blipFill>
+        <p:spPr>
+          <a:xfrm>
+            <a:off x="4243399" y="2198168"/>
+            <a:ext cx="2374900" cy="1955800"/>
+          </a:xfrm>
+          <a:prstGeom prst="rect">
+            <a:avLst/>
+          </a:prstGeom>
+        </p:spPr>
+      </p:pic>
+      <p:sp>
+        <p:nvSpPr>
+          <p:cNvPr id="7" name="Right Arrow 6">
+            <a:extLst>
+              <a:ext uri="{FF2B5EF4-FFF2-40B4-BE49-F238E27FC236}">
+                <a16:creationId xmlns:a16="http://schemas.microsoft.com/office/drawing/2014/main" id="{410FF0E6-EE91-1746-A19F-ADF754D76C59}"/>
+              </a:ext>
+            </a:extLst>
+          </p:cNvPr>
+          <p:cNvSpPr/>
+          <p:nvPr/>
+        </p:nvSpPr>
+        <p:spPr>
+          <a:xfrm rot="5400000">
+            <a:off x="5172959" y="1828277"/>
+            <a:ext cx="715014" cy="564777"/>
+          </a:xfrm>
+          <a:prstGeom prst="rightArrow">
+            <a:avLst/>
+          </a:prstGeom>
+          <a:solidFill>
+            <a:srgbClr val="FFFF00"/>
+          </a:solidFill>
+        </p:spPr>
+        <p:style>
+          <a:lnRef idx="2">
+            <a:schemeClr val="accent1">
+              <a:shade val="50000"/>
+            </a:schemeClr>
+          </a:lnRef>
+          <a:fillRef idx="1">
+            <a:schemeClr val="accent1"/>
+          </a:fillRef>
+          <a:effectRef idx="0">
+            <a:schemeClr val="accent1"/>
+          </a:effectRef>
+          <a:fontRef idx="minor">
+            <a:schemeClr val="lt1"/>
+          </a:fontRef>
+        </p:style>
+        <p:txBody>
+          <a:bodyPr rtlCol="0" anchor="ctr"/>
+          <a:lstStyle/>
+          <a:p>
+            <a:pPr algn="ctr"/>
+            <a:endParaRPr lang="en-US"/>
+          </a:p>
+        </p:txBody>
+      </p:sp>
+      <p:sp>
+        <p:nvSpPr>
+          <p:cNvPr id="11" name="Right Arrow 10">
+            <a:extLst>
+              <a:ext uri="{FF2B5EF4-FFF2-40B4-BE49-F238E27FC236}">
+                <a16:creationId xmlns:a16="http://schemas.microsoft.com/office/drawing/2014/main" id="{2327D89A-2994-0349-B73E-A90293D0BC91}"/>
+              </a:ext>
+            </a:extLst>
+          </p:cNvPr>
+          <p:cNvSpPr/>
+          <p:nvPr/>
+        </p:nvSpPr>
+        <p:spPr>
+          <a:xfrm>
+            <a:off x="7298466" y="1899420"/>
+            <a:ext cx="854919" cy="437692"/>
+          </a:xfrm>
+          <a:prstGeom prst="rightArrow">
+            <a:avLst/>
+          </a:prstGeom>
+          <a:solidFill>
+            <a:srgbClr val="FFFF00"/>
+          </a:solidFill>
+        </p:spPr>
+        <p:style>
+          <a:lnRef idx="2">
+            <a:schemeClr val="accent1">
+              <a:shade val="50000"/>
+            </a:schemeClr>
+          </a:lnRef>
+          <a:fillRef idx="1">
+            <a:schemeClr val="accent1"/>
+          </a:fillRef>
+          <a:effectRef idx="0">
+            <a:schemeClr val="accent1"/>
+          </a:effectRef>
+          <a:fontRef idx="minor">
+            <a:schemeClr val="lt1"/>
+          </a:fontRef>
+        </p:style>
+        <p:txBody>
+          <a:bodyPr rtlCol="0" anchor="ctr"/>
+          <a:lstStyle/>
+          <a:p>
+            <a:pPr algn="ctr"/>
+            <a:r>
+              <a:rPr lang="en-US" sz="1600" dirty="0">
+                <a:solidFill>
+                  <a:schemeClr val="tx1"/>
+                </a:solidFill>
+              </a:rPr>
+              <a:t>#1</a:t>
+            </a:r>
+          </a:p>
+        </p:txBody>
+      </p:sp>
+      <p:sp>
+        <p:nvSpPr>
+          <p:cNvPr id="12" name="Right Arrow 11">
+            <a:extLst>
+              <a:ext uri="{FF2B5EF4-FFF2-40B4-BE49-F238E27FC236}">
+                <a16:creationId xmlns:a16="http://schemas.microsoft.com/office/drawing/2014/main" id="{C40A8DF2-0FDD-164F-8962-B1415E63285C}"/>
+              </a:ext>
+            </a:extLst>
+          </p:cNvPr>
+          <p:cNvSpPr/>
+          <p:nvPr/>
+        </p:nvSpPr>
+        <p:spPr>
+          <a:xfrm>
+            <a:off x="7629164" y="2555571"/>
+            <a:ext cx="854919" cy="437692"/>
+          </a:xfrm>
+          <a:prstGeom prst="rightArrow">
+            <a:avLst/>
+          </a:prstGeom>
+          <a:solidFill>
+            <a:srgbClr val="FFFF00"/>
+          </a:solidFill>
+        </p:spPr>
+        <p:style>
+          <a:lnRef idx="2">
+            <a:schemeClr val="accent1">
+              <a:shade val="50000"/>
+            </a:schemeClr>
+          </a:lnRef>
+          <a:fillRef idx="1">
+            <a:schemeClr val="accent1"/>
+          </a:fillRef>
+          <a:effectRef idx="0">
+            <a:schemeClr val="accent1"/>
+          </a:effectRef>
+          <a:fontRef idx="minor">
+            <a:schemeClr val="lt1"/>
+          </a:fontRef>
+        </p:style>
+        <p:txBody>
+          <a:bodyPr rtlCol="0" anchor="ctr"/>
+          <a:lstStyle/>
+          <a:p>
+            <a:pPr algn="ctr"/>
+            <a:r>
+              <a:rPr lang="en-US" sz="1600" dirty="0">
+                <a:solidFill>
+                  <a:schemeClr val="tx1"/>
+                </a:solidFill>
+              </a:rPr>
+              <a:t>#2</a:t>
+            </a:r>
+          </a:p>
+        </p:txBody>
+      </p:sp>
+      <p:sp>
+        <p:nvSpPr>
+          <p:cNvPr id="13" name="Right Arrow 12">
+            <a:extLst>
+              <a:ext uri="{FF2B5EF4-FFF2-40B4-BE49-F238E27FC236}">
+                <a16:creationId xmlns:a16="http://schemas.microsoft.com/office/drawing/2014/main" id="{1D257F7A-602D-8346-9599-0AD35AF361DA}"/>
+              </a:ext>
+            </a:extLst>
+          </p:cNvPr>
+          <p:cNvSpPr/>
+          <p:nvPr/>
+        </p:nvSpPr>
+        <p:spPr>
+          <a:xfrm>
+            <a:off x="7629164" y="2883646"/>
+            <a:ext cx="854919" cy="437692"/>
+          </a:xfrm>
+          <a:prstGeom prst="rightArrow">
+            <a:avLst/>
+          </a:prstGeom>
+          <a:solidFill>
+            <a:srgbClr val="FFFF00"/>
+          </a:solidFill>
+        </p:spPr>
+        <p:style>
+          <a:lnRef idx="2">
+            <a:schemeClr val="accent1">
+              <a:shade val="50000"/>
+            </a:schemeClr>
+          </a:lnRef>
+          <a:fillRef idx="1">
+            <a:schemeClr val="accent1"/>
+          </a:fillRef>
+          <a:effectRef idx="0">
+            <a:schemeClr val="accent1"/>
+          </a:effectRef>
+          <a:fontRef idx="minor">
+            <a:schemeClr val="lt1"/>
+          </a:fontRef>
+        </p:style>
+        <p:txBody>
+          <a:bodyPr rtlCol="0" anchor="ctr"/>
+          <a:lstStyle/>
+          <a:p>
+            <a:pPr algn="ctr"/>
+            <a:r>
+              <a:rPr lang="en-US" sz="1600" dirty="0">
+                <a:solidFill>
+                  <a:schemeClr val="tx1"/>
+                </a:solidFill>
+              </a:rPr>
+              <a:t>#3</a:t>
+            </a:r>
+          </a:p>
+        </p:txBody>
+      </p:sp>
+      <p:pic>
+        <p:nvPicPr>
+          <p:cNvPr id="14" name="Picture 13">
+            <a:extLst>
+              <a:ext uri="{FF2B5EF4-FFF2-40B4-BE49-F238E27FC236}">
+                <a16:creationId xmlns:a16="http://schemas.microsoft.com/office/drawing/2014/main" id="{8D51C1CA-B3F1-2243-A78A-BD4E34E7D7CF}"/>
+              </a:ext>
+            </a:extLst>
+          </p:cNvPr>
+          <p:cNvPicPr>
+            <a:picLocks noChangeAspect="1"/>
+          </p:cNvPicPr>
+          <p:nvPr/>
+        </p:nvPicPr>
+        <p:blipFill>
+          <a:blip r:embed="rId6"/>
+          <a:stretch>
+            <a:fillRect/>
+          </a:stretch>
+        </p:blipFill>
+        <p:spPr>
+          <a:xfrm>
+            <a:off x="66455" y="198839"/>
+            <a:ext cx="1836774" cy="1561645"/>
+          </a:xfrm>
+          <a:prstGeom prst="rect">
+            <a:avLst/>
+          </a:prstGeom>
+        </p:spPr>
+      </p:pic>
+      <p:sp>
+        <p:nvSpPr>
+          <p:cNvPr id="16" name="Right Arrow 15">
+            <a:extLst>
+              <a:ext uri="{FF2B5EF4-FFF2-40B4-BE49-F238E27FC236}">
+                <a16:creationId xmlns:a16="http://schemas.microsoft.com/office/drawing/2014/main" id="{6BAAC047-A7D8-B542-BD1C-E5A9163E57D4}"/>
+              </a:ext>
+            </a:extLst>
+          </p:cNvPr>
+          <p:cNvSpPr/>
+          <p:nvPr/>
+        </p:nvSpPr>
+        <p:spPr>
+          <a:xfrm>
+            <a:off x="1951611" y="1461728"/>
+            <a:ext cx="854919" cy="437692"/>
+          </a:xfrm>
+          <a:prstGeom prst="rightArrow">
+            <a:avLst/>
+          </a:prstGeom>
+          <a:solidFill>
+            <a:srgbClr val="FFFF00"/>
+          </a:solidFill>
+        </p:spPr>
+        <p:style>
+          <a:lnRef idx="2">
+            <a:schemeClr val="accent1">
+              <a:shade val="50000"/>
+            </a:schemeClr>
+          </a:lnRef>
+          <a:fillRef idx="1">
+            <a:schemeClr val="accent1"/>
+          </a:fillRef>
+          <a:effectRef idx="0">
+            <a:schemeClr val="accent1"/>
+          </a:effectRef>
+          <a:fontRef idx="minor">
+            <a:schemeClr val="lt1"/>
+          </a:fontRef>
+        </p:style>
+        <p:txBody>
+          <a:bodyPr rtlCol="0" anchor="ctr"/>
+          <a:lstStyle/>
+          <a:p>
+            <a:pPr algn="ctr"/>
+            <a:r>
+              <a:rPr lang="en-US" sz="1600" dirty="0">
+                <a:solidFill>
+                  <a:schemeClr val="tx1"/>
+                </a:solidFill>
+              </a:rPr>
+              <a:t>#1</a:t>
+            </a:r>
+          </a:p>
+        </p:txBody>
+      </p:sp>
+      <p:sp>
+        <p:nvSpPr>
+          <p:cNvPr id="17" name="Right Arrow 16">
+            <a:extLst>
+              <a:ext uri="{FF2B5EF4-FFF2-40B4-BE49-F238E27FC236}">
+                <a16:creationId xmlns:a16="http://schemas.microsoft.com/office/drawing/2014/main" id="{97053D72-6E8E-4F4B-8614-718CD80AC9FD}"/>
+              </a:ext>
+            </a:extLst>
+          </p:cNvPr>
+          <p:cNvSpPr/>
+          <p:nvPr/>
+        </p:nvSpPr>
+        <p:spPr>
+          <a:xfrm>
+            <a:off x="3449132" y="3436861"/>
+            <a:ext cx="854919" cy="437692"/>
+          </a:xfrm>
+          <a:prstGeom prst="rightArrow">
+            <a:avLst/>
+          </a:prstGeom>
+          <a:solidFill>
+            <a:srgbClr val="FFFF00"/>
+          </a:solidFill>
+        </p:spPr>
+        <p:style>
+          <a:lnRef idx="2">
+            <a:schemeClr val="accent1">
+              <a:shade val="50000"/>
+            </a:schemeClr>
+          </a:lnRef>
+          <a:fillRef idx="1">
+            <a:schemeClr val="accent1"/>
+          </a:fillRef>
+          <a:effectRef idx="0">
+            <a:schemeClr val="accent1"/>
+          </a:effectRef>
+          <a:fontRef idx="minor">
+            <a:schemeClr val="lt1"/>
+          </a:fontRef>
+        </p:style>
+        <p:txBody>
+          <a:bodyPr rtlCol="0" anchor="ctr"/>
+          <a:lstStyle/>
+          <a:p>
+            <a:pPr algn="ctr"/>
+            <a:r>
+              <a:rPr lang="en-US" sz="1600" dirty="0">
+                <a:solidFill>
+                  <a:schemeClr val="tx1"/>
+                </a:solidFill>
+              </a:rPr>
+              <a:t>#3</a:t>
+            </a:r>
+          </a:p>
+        </p:txBody>
+      </p:sp>
+      <p:sp>
+        <p:nvSpPr>
+          <p:cNvPr id="18" name="Rectangle 17">
+            <a:extLst>
+              <a:ext uri="{FF2B5EF4-FFF2-40B4-BE49-F238E27FC236}">
+                <a16:creationId xmlns:a16="http://schemas.microsoft.com/office/drawing/2014/main" id="{9C3353DB-C181-5C48-8F93-8A4A76F804CA}"/>
+              </a:ext>
+            </a:extLst>
+          </p:cNvPr>
+          <p:cNvSpPr/>
+          <p:nvPr/>
+        </p:nvSpPr>
+        <p:spPr>
+          <a:xfrm>
+            <a:off x="5334739" y="1872435"/>
+            <a:ext cx="391453" cy="338554"/>
+          </a:xfrm>
+          <a:prstGeom prst="rect">
+            <a:avLst/>
+          </a:prstGeom>
+        </p:spPr>
+        <p:txBody>
+          <a:bodyPr wrap="none">
+            <a:spAutoFit/>
+          </a:bodyPr>
+          <a:lstStyle/>
+          <a:p>
+            <a:pPr algn="ctr"/>
+            <a:r>
+              <a:rPr lang="en-US" sz="1600" dirty="0"/>
+              <a:t>#2</a:t>
+            </a:r>
+          </a:p>
+        </p:txBody>
+      </p:sp>
+      <p:pic>
+        <p:nvPicPr>
+          <p:cNvPr id="19" name="Picture 18">
+            <a:extLst>
+              <a:ext uri="{FF2B5EF4-FFF2-40B4-BE49-F238E27FC236}">
+                <a16:creationId xmlns:a16="http://schemas.microsoft.com/office/drawing/2014/main" id="{62BD8ED1-D592-544C-9F9D-026BF0AB198C}"/>
+              </a:ext>
+            </a:extLst>
+          </p:cNvPr>
+          <p:cNvPicPr>
+            <a:picLocks noChangeAspect="1"/>
+          </p:cNvPicPr>
+          <p:nvPr/>
+        </p:nvPicPr>
+        <p:blipFill>
+          <a:blip r:embed="rId7"/>
+          <a:stretch>
+            <a:fillRect/>
+          </a:stretch>
+        </p:blipFill>
+        <p:spPr>
+          <a:xfrm>
+            <a:off x="107317" y="701192"/>
+            <a:ext cx="5227422" cy="3139794"/>
+          </a:xfrm>
+          <a:prstGeom prst="rect">
+            <a:avLst/>
+          </a:prstGeom>
+        </p:spPr>
+      </p:pic>
+      <p:pic>
+        <p:nvPicPr>
+          <p:cNvPr id="20" name="Picture 19">
+            <a:extLst>
+              <a:ext uri="{FF2B5EF4-FFF2-40B4-BE49-F238E27FC236}">
+                <a16:creationId xmlns:a16="http://schemas.microsoft.com/office/drawing/2014/main" id="{F5ECDCE1-C3CA-5746-8896-EDB61D278055}"/>
+              </a:ext>
+            </a:extLst>
+          </p:cNvPr>
+          <p:cNvPicPr>
+            <a:picLocks noChangeAspect="1"/>
+          </p:cNvPicPr>
+          <p:nvPr/>
+        </p:nvPicPr>
+        <p:blipFill>
+          <a:blip r:embed="rId8"/>
+          <a:stretch>
+            <a:fillRect/>
+          </a:stretch>
+        </p:blipFill>
+        <p:spPr>
+          <a:xfrm>
+            <a:off x="4636838" y="1595515"/>
+            <a:ext cx="4413335" cy="2505635"/>
+          </a:xfrm>
+          <a:prstGeom prst="rect">
+            <a:avLst/>
+          </a:prstGeom>
+        </p:spPr>
+      </p:pic>
+    </p:spTree>
+    <p:extLst>
+      <p:ext uri="{BB962C8B-B14F-4D97-AF65-F5344CB8AC3E}">
+        <p14:creationId xmlns:p14="http://schemas.microsoft.com/office/powerpoint/2010/main" val="1043297878"/>
+      </p:ext>
+    </p:extLst>
+  </p:cSld>
+  <p:clrMapOvr>
+    <a:masterClrMapping/>
+  </p:clrMapOvr>
+</p:sld>
+</file>
+
 <file path=ppt/theme/theme1.xml><?xml version="1.0" encoding="utf-8"?>
 <a:theme xmlns:a="http://schemas.openxmlformats.org/drawingml/2006/main" name="Office Theme">
   <a:themeElements>

</xml_diff>

<commit_message>
Add push annotation example
</commit_message>
<xml_diff>
--- a/images/jenkins library readme images.pptx
+++ b/images/jenkins library readme images.pptx
@@ -9,6 +9,7 @@
     <p:sldId id="257" r:id="rId3"/>
     <p:sldId id="258" r:id="rId4"/>
     <p:sldId id="259" r:id="rId5"/>
+    <p:sldId id="260" r:id="rId6"/>
   </p:sldIdLst>
   <p:sldSz cx="12192000" cy="6858000"/>
   <p:notesSz cx="6858000" cy="9144000"/>
@@ -4285,7 +4286,7 @@
         </p:blipFill>
         <p:spPr>
           <a:xfrm>
-            <a:off x="4636838" y="1595515"/>
+            <a:off x="5470878" y="3169159"/>
             <a:ext cx="4413335" cy="2505635"/>
           </a:xfrm>
           <a:prstGeom prst="rect">
@@ -4297,6 +4298,320 @@
     <p:extLst>
       <p:ext uri="{BB962C8B-B14F-4D97-AF65-F5344CB8AC3E}">
         <p14:creationId xmlns:p14="http://schemas.microsoft.com/office/powerpoint/2010/main" val="1043297878"/>
+      </p:ext>
+    </p:extLst>
+  </p:cSld>
+  <p:clrMapOvr>
+    <a:masterClrMapping/>
+  </p:clrMapOvr>
+</p:sld>
+</file>
+
+<file path=ppt/slides/slide5.xml><?xml version="1.0" encoding="utf-8"?>
+<p:sld xmlns:a="http://schemas.openxmlformats.org/drawingml/2006/main" xmlns:r="http://schemas.openxmlformats.org/officeDocument/2006/relationships" xmlns:p="http://schemas.openxmlformats.org/presentationml/2006/main">
+  <p:cSld>
+    <p:spTree>
+      <p:nvGrpSpPr>
+        <p:cNvPr id="1" name=""/>
+        <p:cNvGrpSpPr/>
+        <p:nvPr/>
+      </p:nvGrpSpPr>
+      <p:grpSpPr>
+        <a:xfrm>
+          <a:off x="0" y="0"/>
+          <a:ext cx="0" cy="0"/>
+          <a:chOff x="0" y="0"/>
+          <a:chExt cx="0" cy="0"/>
+        </a:xfrm>
+      </p:grpSpPr>
+      <p:pic>
+        <p:nvPicPr>
+          <p:cNvPr id="4" name="Picture 3">
+            <a:extLst>
+              <a:ext uri="{FF2B5EF4-FFF2-40B4-BE49-F238E27FC236}">
+                <a16:creationId xmlns:a16="http://schemas.microsoft.com/office/drawing/2014/main" id="{612058DD-15C7-304D-8395-C6EA811FDEED}"/>
+              </a:ext>
+            </a:extLst>
+          </p:cNvPr>
+          <p:cNvPicPr>
+            <a:picLocks noChangeAspect="1"/>
+          </p:cNvPicPr>
+          <p:nvPr/>
+        </p:nvPicPr>
+        <p:blipFill>
+          <a:blip r:embed="rId2"/>
+          <a:stretch>
+            <a:fillRect/>
+          </a:stretch>
+        </p:blipFill>
+        <p:spPr>
+          <a:xfrm>
+            <a:off x="2708438" y="1310184"/>
+            <a:ext cx="5480772" cy="5547815"/>
+          </a:xfrm>
+          <a:prstGeom prst="rect">
+            <a:avLst/>
+          </a:prstGeom>
+        </p:spPr>
+      </p:pic>
+      <p:pic>
+        <p:nvPicPr>
+          <p:cNvPr id="5" name="Picture 4">
+            <a:extLst>
+              <a:ext uri="{FF2B5EF4-FFF2-40B4-BE49-F238E27FC236}">
+                <a16:creationId xmlns:a16="http://schemas.microsoft.com/office/drawing/2014/main" id="{A0B9B83F-3902-164E-B8C8-F022AB27C7F9}"/>
+              </a:ext>
+            </a:extLst>
+          </p:cNvPr>
+          <p:cNvPicPr>
+            <a:picLocks noChangeAspect="1"/>
+          </p:cNvPicPr>
+          <p:nvPr/>
+        </p:nvPicPr>
+        <p:blipFill>
+          <a:blip r:embed="rId3"/>
+          <a:stretch>
+            <a:fillRect/>
+          </a:stretch>
+        </p:blipFill>
+        <p:spPr>
+          <a:xfrm>
+            <a:off x="6096000" y="3655231"/>
+            <a:ext cx="2093210" cy="393700"/>
+          </a:xfrm>
+          <a:prstGeom prst="rect">
+            <a:avLst/>
+          </a:prstGeom>
+        </p:spPr>
+      </p:pic>
+      <p:sp>
+        <p:nvSpPr>
+          <p:cNvPr id="6" name="Right Arrow 5">
+            <a:extLst>
+              <a:ext uri="{FF2B5EF4-FFF2-40B4-BE49-F238E27FC236}">
+                <a16:creationId xmlns:a16="http://schemas.microsoft.com/office/drawing/2014/main" id="{548B05E7-2411-F241-928A-5EDE2EF4CB17}"/>
+              </a:ext>
+            </a:extLst>
+          </p:cNvPr>
+          <p:cNvSpPr/>
+          <p:nvPr/>
+        </p:nvSpPr>
+        <p:spPr>
+          <a:xfrm>
+            <a:off x="2080896" y="1310665"/>
+            <a:ext cx="854919" cy="437692"/>
+          </a:xfrm>
+          <a:prstGeom prst="rightArrow">
+            <a:avLst/>
+          </a:prstGeom>
+          <a:solidFill>
+            <a:srgbClr val="FFFF00"/>
+          </a:solidFill>
+        </p:spPr>
+        <p:style>
+          <a:lnRef idx="2">
+            <a:schemeClr val="accent1">
+              <a:shade val="50000"/>
+            </a:schemeClr>
+          </a:lnRef>
+          <a:fillRef idx="1">
+            <a:schemeClr val="accent1"/>
+          </a:fillRef>
+          <a:effectRef idx="0">
+            <a:schemeClr val="accent1"/>
+          </a:effectRef>
+          <a:fontRef idx="minor">
+            <a:schemeClr val="lt1"/>
+          </a:fontRef>
+        </p:style>
+        <p:txBody>
+          <a:bodyPr rtlCol="0" anchor="ctr"/>
+          <a:lstStyle/>
+          <a:p>
+            <a:pPr algn="ctr"/>
+            <a:r>
+              <a:rPr lang="en-US" sz="1600" dirty="0">
+                <a:solidFill>
+                  <a:schemeClr val="tx1"/>
+                </a:solidFill>
+              </a:rPr>
+              <a:t>#1</a:t>
+            </a:r>
+          </a:p>
+        </p:txBody>
+      </p:sp>
+      <p:sp>
+        <p:nvSpPr>
+          <p:cNvPr id="7" name="Right Arrow 6">
+            <a:extLst>
+              <a:ext uri="{FF2B5EF4-FFF2-40B4-BE49-F238E27FC236}">
+                <a16:creationId xmlns:a16="http://schemas.microsoft.com/office/drawing/2014/main" id="{6902B800-727C-B142-8DF6-B490819B0543}"/>
+              </a:ext>
+            </a:extLst>
+          </p:cNvPr>
+          <p:cNvSpPr/>
+          <p:nvPr/>
+        </p:nvSpPr>
+        <p:spPr>
+          <a:xfrm>
+            <a:off x="2094545" y="1685078"/>
+            <a:ext cx="854919" cy="437692"/>
+          </a:xfrm>
+          <a:prstGeom prst="rightArrow">
+            <a:avLst/>
+          </a:prstGeom>
+          <a:solidFill>
+            <a:srgbClr val="FFFF00"/>
+          </a:solidFill>
+        </p:spPr>
+        <p:style>
+          <a:lnRef idx="2">
+            <a:schemeClr val="accent1">
+              <a:shade val="50000"/>
+            </a:schemeClr>
+          </a:lnRef>
+          <a:fillRef idx="1">
+            <a:schemeClr val="accent1"/>
+          </a:fillRef>
+          <a:effectRef idx="0">
+            <a:schemeClr val="accent1"/>
+          </a:effectRef>
+          <a:fontRef idx="minor">
+            <a:schemeClr val="lt1"/>
+          </a:fontRef>
+        </p:style>
+        <p:txBody>
+          <a:bodyPr rtlCol="0" anchor="ctr"/>
+          <a:lstStyle/>
+          <a:p>
+            <a:pPr algn="ctr"/>
+            <a:r>
+              <a:rPr lang="en-US" sz="1600" dirty="0">
+                <a:solidFill>
+                  <a:schemeClr val="tx1"/>
+                </a:solidFill>
+              </a:rPr>
+              <a:t>#2</a:t>
+            </a:r>
+          </a:p>
+        </p:txBody>
+      </p:sp>
+      <p:sp>
+        <p:nvSpPr>
+          <p:cNvPr id="8" name="Right Arrow 7">
+            <a:extLst>
+              <a:ext uri="{FF2B5EF4-FFF2-40B4-BE49-F238E27FC236}">
+                <a16:creationId xmlns:a16="http://schemas.microsoft.com/office/drawing/2014/main" id="{CF66629B-E4AA-E947-855D-2077A32E0408}"/>
+              </a:ext>
+            </a:extLst>
+          </p:cNvPr>
+          <p:cNvSpPr/>
+          <p:nvPr/>
+        </p:nvSpPr>
+        <p:spPr>
+          <a:xfrm>
+            <a:off x="2308274" y="3291159"/>
+            <a:ext cx="854919" cy="437692"/>
+          </a:xfrm>
+          <a:prstGeom prst="rightArrow">
+            <a:avLst/>
+          </a:prstGeom>
+          <a:solidFill>
+            <a:srgbClr val="FFFF00"/>
+          </a:solidFill>
+        </p:spPr>
+        <p:style>
+          <a:lnRef idx="2">
+            <a:schemeClr val="accent1">
+              <a:shade val="50000"/>
+            </a:schemeClr>
+          </a:lnRef>
+          <a:fillRef idx="1">
+            <a:schemeClr val="accent1"/>
+          </a:fillRef>
+          <a:effectRef idx="0">
+            <a:schemeClr val="accent1"/>
+          </a:effectRef>
+          <a:fontRef idx="minor">
+            <a:schemeClr val="lt1"/>
+          </a:fontRef>
+        </p:style>
+        <p:txBody>
+          <a:bodyPr rtlCol="0" anchor="ctr"/>
+          <a:lstStyle/>
+          <a:p>
+            <a:pPr algn="ctr"/>
+            <a:r>
+              <a:rPr lang="en-US" sz="1600" dirty="0">
+                <a:solidFill>
+                  <a:schemeClr val="tx1"/>
+                </a:solidFill>
+              </a:rPr>
+              <a:t>#3</a:t>
+            </a:r>
+          </a:p>
+        </p:txBody>
+      </p:sp>
+      <p:sp>
+        <p:nvSpPr>
+          <p:cNvPr id="9" name="Right Arrow 8">
+            <a:extLst>
+              <a:ext uri="{FF2B5EF4-FFF2-40B4-BE49-F238E27FC236}">
+                <a16:creationId xmlns:a16="http://schemas.microsoft.com/office/drawing/2014/main" id="{F491900D-0F01-244D-9329-8ACF4681CB07}"/>
+              </a:ext>
+            </a:extLst>
+          </p:cNvPr>
+          <p:cNvSpPr/>
+          <p:nvPr/>
+        </p:nvSpPr>
+        <p:spPr>
+          <a:xfrm>
+            <a:off x="3231943" y="4504543"/>
+            <a:ext cx="854919" cy="437692"/>
+          </a:xfrm>
+          <a:prstGeom prst="rightArrow">
+            <a:avLst/>
+          </a:prstGeom>
+          <a:solidFill>
+            <a:srgbClr val="FFFF00"/>
+          </a:solidFill>
+        </p:spPr>
+        <p:style>
+          <a:lnRef idx="2">
+            <a:schemeClr val="accent1">
+              <a:shade val="50000"/>
+            </a:schemeClr>
+          </a:lnRef>
+          <a:fillRef idx="1">
+            <a:schemeClr val="accent1"/>
+          </a:fillRef>
+          <a:effectRef idx="0">
+            <a:schemeClr val="accent1"/>
+          </a:effectRef>
+          <a:fontRef idx="minor">
+            <a:schemeClr val="lt1"/>
+          </a:fontRef>
+        </p:style>
+        <p:txBody>
+          <a:bodyPr rtlCol="0" anchor="ctr"/>
+          <a:lstStyle/>
+          <a:p>
+            <a:pPr algn="ctr"/>
+            <a:r>
+              <a:rPr lang="en-US" sz="1600" dirty="0">
+                <a:solidFill>
+                  <a:schemeClr val="tx1"/>
+                </a:solidFill>
+              </a:rPr>
+              <a:t>#4</a:t>
+            </a:r>
+          </a:p>
+        </p:txBody>
+      </p:sp>
+    </p:spTree>
+    <p:extLst>
+      <p:ext uri="{BB962C8B-B14F-4D97-AF65-F5344CB8AC3E}">
+        <p14:creationId xmlns:p14="http://schemas.microsoft.com/office/powerpoint/2010/main" val="3105295938"/>
       </p:ext>
     </p:extLst>
   </p:cSld>

</xml_diff>

<commit_message>
update setup with http plugin instructions
</commit_message>
<xml_diff>
--- a/images/jenkins library readme images.pptx
+++ b/images/jenkins library readme images.pptx
@@ -10,6 +10,7 @@
     <p:sldId id="258" r:id="rId4"/>
     <p:sldId id="259" r:id="rId5"/>
     <p:sldId id="260" r:id="rId6"/>
+    <p:sldId id="261" r:id="rId7"/>
   </p:sldIdLst>
   <p:sldSz cx="12192000" cy="6858000"/>
   <p:notesSz cx="6858000" cy="9144000"/>
@@ -263,7 +264,7 @@
           <a:p>
             <a:fld id="{E1365ACA-08A2-A04C-80CB-68DC66F31BF2}" type="datetimeFigureOut">
               <a:rPr lang="en-US" smtClean="0"/>
-              <a:t>10/26/20</a:t>
+              <a:t>10/27/20</a:t>
             </a:fld>
             <a:endParaRPr lang="en-US"/>
           </a:p>
@@ -461,7 +462,7 @@
           <a:p>
             <a:fld id="{E1365ACA-08A2-A04C-80CB-68DC66F31BF2}" type="datetimeFigureOut">
               <a:rPr lang="en-US" smtClean="0"/>
-              <a:t>10/26/20</a:t>
+              <a:t>10/27/20</a:t>
             </a:fld>
             <a:endParaRPr lang="en-US"/>
           </a:p>
@@ -669,7 +670,7 @@
           <a:p>
             <a:fld id="{E1365ACA-08A2-A04C-80CB-68DC66F31BF2}" type="datetimeFigureOut">
               <a:rPr lang="en-US" smtClean="0"/>
-              <a:t>10/26/20</a:t>
+              <a:t>10/27/20</a:t>
             </a:fld>
             <a:endParaRPr lang="en-US"/>
           </a:p>
@@ -867,7 +868,7 @@
           <a:p>
             <a:fld id="{E1365ACA-08A2-A04C-80CB-68DC66F31BF2}" type="datetimeFigureOut">
               <a:rPr lang="en-US" smtClean="0"/>
-              <a:t>10/26/20</a:t>
+              <a:t>10/27/20</a:t>
             </a:fld>
             <a:endParaRPr lang="en-US"/>
           </a:p>
@@ -1142,7 +1143,7 @@
           <a:p>
             <a:fld id="{E1365ACA-08A2-A04C-80CB-68DC66F31BF2}" type="datetimeFigureOut">
               <a:rPr lang="en-US" smtClean="0"/>
-              <a:t>10/26/20</a:t>
+              <a:t>10/27/20</a:t>
             </a:fld>
             <a:endParaRPr lang="en-US"/>
           </a:p>
@@ -1407,7 +1408,7 @@
           <a:p>
             <a:fld id="{E1365ACA-08A2-A04C-80CB-68DC66F31BF2}" type="datetimeFigureOut">
               <a:rPr lang="en-US" smtClean="0"/>
-              <a:t>10/26/20</a:t>
+              <a:t>10/27/20</a:t>
             </a:fld>
             <a:endParaRPr lang="en-US"/>
           </a:p>
@@ -1819,7 +1820,7 @@
           <a:p>
             <a:fld id="{E1365ACA-08A2-A04C-80CB-68DC66F31BF2}" type="datetimeFigureOut">
               <a:rPr lang="en-US" smtClean="0"/>
-              <a:t>10/26/20</a:t>
+              <a:t>10/27/20</a:t>
             </a:fld>
             <a:endParaRPr lang="en-US"/>
           </a:p>
@@ -1960,7 +1961,7 @@
           <a:p>
             <a:fld id="{E1365ACA-08A2-A04C-80CB-68DC66F31BF2}" type="datetimeFigureOut">
               <a:rPr lang="en-US" smtClean="0"/>
-              <a:t>10/26/20</a:t>
+              <a:t>10/27/20</a:t>
             </a:fld>
             <a:endParaRPr lang="en-US"/>
           </a:p>
@@ -2073,7 +2074,7 @@
           <a:p>
             <a:fld id="{E1365ACA-08A2-A04C-80CB-68DC66F31BF2}" type="datetimeFigureOut">
               <a:rPr lang="en-US" smtClean="0"/>
-              <a:t>10/26/20</a:t>
+              <a:t>10/27/20</a:t>
             </a:fld>
             <a:endParaRPr lang="en-US"/>
           </a:p>
@@ -2384,7 +2385,7 @@
           <a:p>
             <a:fld id="{E1365ACA-08A2-A04C-80CB-68DC66F31BF2}" type="datetimeFigureOut">
               <a:rPr lang="en-US" smtClean="0"/>
-              <a:t>10/26/20</a:t>
+              <a:t>10/27/20</a:t>
             </a:fld>
             <a:endParaRPr lang="en-US"/>
           </a:p>
@@ -2672,7 +2673,7 @@
           <a:p>
             <a:fld id="{E1365ACA-08A2-A04C-80CB-68DC66F31BF2}" type="datetimeFigureOut">
               <a:rPr lang="en-US" smtClean="0"/>
-              <a:t>10/26/20</a:t>
+              <a:t>10/27/20</a:t>
             </a:fld>
             <a:endParaRPr lang="en-US"/>
           </a:p>
@@ -2913,7 +2914,7 @@
           <a:p>
             <a:fld id="{E1365ACA-08A2-A04C-80CB-68DC66F31BF2}" type="datetimeFigureOut">
               <a:rPr lang="en-US" smtClean="0"/>
-              <a:t>10/26/20</a:t>
+              <a:t>10/27/20</a:t>
             </a:fld>
             <a:endParaRPr lang="en-US"/>
           </a:p>
@@ -4621,6 +4622,384 @@
 </p:sld>
 </file>
 
+<file path=ppt/slides/slide6.xml><?xml version="1.0" encoding="utf-8"?>
+<p:sld xmlns:a="http://schemas.openxmlformats.org/drawingml/2006/main" xmlns:r="http://schemas.openxmlformats.org/officeDocument/2006/relationships" xmlns:p="http://schemas.openxmlformats.org/presentationml/2006/main">
+  <p:cSld>
+    <p:spTree>
+      <p:nvGrpSpPr>
+        <p:cNvPr id="1" name=""/>
+        <p:cNvGrpSpPr/>
+        <p:nvPr/>
+      </p:nvGrpSpPr>
+      <p:grpSpPr>
+        <a:xfrm>
+          <a:off x="0" y="0"/>
+          <a:ext cx="0" cy="0"/>
+          <a:chOff x="0" y="0"/>
+          <a:chExt cx="0" cy="0"/>
+        </a:xfrm>
+      </p:grpSpPr>
+      <p:pic>
+        <p:nvPicPr>
+          <p:cNvPr id="4" name="Picture 3">
+            <a:extLst>
+              <a:ext uri="{FF2B5EF4-FFF2-40B4-BE49-F238E27FC236}">
+                <a16:creationId xmlns:a16="http://schemas.microsoft.com/office/drawing/2014/main" id="{8BCE3390-728A-9547-ADE5-E84E437D6789}"/>
+              </a:ext>
+            </a:extLst>
+          </p:cNvPr>
+          <p:cNvPicPr>
+            <a:picLocks noChangeAspect="1"/>
+          </p:cNvPicPr>
+          <p:nvPr/>
+        </p:nvPicPr>
+        <p:blipFill>
+          <a:blip r:embed="rId2"/>
+          <a:stretch>
+            <a:fillRect/>
+          </a:stretch>
+        </p:blipFill>
+        <p:spPr>
+          <a:xfrm>
+            <a:off x="1539009" y="849189"/>
+            <a:ext cx="3143827" cy="2100461"/>
+          </a:xfrm>
+          <a:prstGeom prst="rect">
+            <a:avLst/>
+          </a:prstGeom>
+        </p:spPr>
+      </p:pic>
+      <p:sp>
+        <p:nvSpPr>
+          <p:cNvPr id="5" name="Right Arrow 4">
+            <a:extLst>
+              <a:ext uri="{FF2B5EF4-FFF2-40B4-BE49-F238E27FC236}">
+                <a16:creationId xmlns:a16="http://schemas.microsoft.com/office/drawing/2014/main" id="{8384F335-9F1B-974A-98FA-86F1DDA3C1B0}"/>
+              </a:ext>
+            </a:extLst>
+          </p:cNvPr>
+          <p:cNvSpPr/>
+          <p:nvPr/>
+        </p:nvSpPr>
+        <p:spPr>
+          <a:xfrm>
+            <a:off x="684090" y="2199527"/>
+            <a:ext cx="854919" cy="437692"/>
+          </a:xfrm>
+          <a:prstGeom prst="rightArrow">
+            <a:avLst/>
+          </a:prstGeom>
+          <a:solidFill>
+            <a:srgbClr val="FFFF00"/>
+          </a:solidFill>
+        </p:spPr>
+        <p:style>
+          <a:lnRef idx="2">
+            <a:schemeClr val="accent1">
+              <a:shade val="50000"/>
+            </a:schemeClr>
+          </a:lnRef>
+          <a:fillRef idx="1">
+            <a:schemeClr val="accent1"/>
+          </a:fillRef>
+          <a:effectRef idx="0">
+            <a:schemeClr val="accent1"/>
+          </a:effectRef>
+          <a:fontRef idx="minor">
+            <a:schemeClr val="lt1"/>
+          </a:fontRef>
+        </p:style>
+        <p:txBody>
+          <a:bodyPr rtlCol="0" anchor="ctr"/>
+          <a:lstStyle/>
+          <a:p>
+            <a:pPr algn="ctr"/>
+            <a:r>
+              <a:rPr lang="en-US" sz="1600" dirty="0">
+                <a:solidFill>
+                  <a:schemeClr val="tx1"/>
+                </a:solidFill>
+              </a:rPr>
+              <a:t>#1</a:t>
+            </a:r>
+          </a:p>
+        </p:txBody>
+      </p:sp>
+      <p:sp>
+        <p:nvSpPr>
+          <p:cNvPr id="6" name="Right Arrow 5">
+            <a:extLst>
+              <a:ext uri="{FF2B5EF4-FFF2-40B4-BE49-F238E27FC236}">
+                <a16:creationId xmlns:a16="http://schemas.microsoft.com/office/drawing/2014/main" id="{0218D720-B1FE-2A44-912E-5DA958291C73}"/>
+              </a:ext>
+            </a:extLst>
+          </p:cNvPr>
+          <p:cNvSpPr/>
+          <p:nvPr/>
+        </p:nvSpPr>
+        <p:spPr>
+          <a:xfrm>
+            <a:off x="2157253" y="1955693"/>
+            <a:ext cx="854919" cy="437692"/>
+          </a:xfrm>
+          <a:prstGeom prst="rightArrow">
+            <a:avLst/>
+          </a:prstGeom>
+          <a:solidFill>
+            <a:srgbClr val="FFFF00"/>
+          </a:solidFill>
+        </p:spPr>
+        <p:style>
+          <a:lnRef idx="2">
+            <a:schemeClr val="accent1">
+              <a:shade val="50000"/>
+            </a:schemeClr>
+          </a:lnRef>
+          <a:fillRef idx="1">
+            <a:schemeClr val="accent1"/>
+          </a:fillRef>
+          <a:effectRef idx="0">
+            <a:schemeClr val="accent1"/>
+          </a:effectRef>
+          <a:fontRef idx="minor">
+            <a:schemeClr val="lt1"/>
+          </a:fontRef>
+        </p:style>
+        <p:txBody>
+          <a:bodyPr rtlCol="0" anchor="ctr"/>
+          <a:lstStyle/>
+          <a:p>
+            <a:pPr algn="ctr"/>
+            <a:r>
+              <a:rPr lang="en-US" sz="1600" dirty="0">
+                <a:solidFill>
+                  <a:schemeClr val="tx1"/>
+                </a:solidFill>
+              </a:rPr>
+              <a:t>#2</a:t>
+            </a:r>
+          </a:p>
+        </p:txBody>
+      </p:sp>
+      <p:pic>
+        <p:nvPicPr>
+          <p:cNvPr id="8" name="Picture 7">
+            <a:extLst>
+              <a:ext uri="{FF2B5EF4-FFF2-40B4-BE49-F238E27FC236}">
+                <a16:creationId xmlns:a16="http://schemas.microsoft.com/office/drawing/2014/main" id="{2AC41ADC-47A0-A64C-9C29-A5126531DF0B}"/>
+              </a:ext>
+            </a:extLst>
+          </p:cNvPr>
+          <p:cNvPicPr>
+            <a:picLocks noChangeAspect="1"/>
+          </p:cNvPicPr>
+          <p:nvPr/>
+        </p:nvPicPr>
+        <p:blipFill>
+          <a:blip r:embed="rId3"/>
+          <a:stretch>
+            <a:fillRect/>
+          </a:stretch>
+        </p:blipFill>
+        <p:spPr>
+          <a:xfrm>
+            <a:off x="3110922" y="1041512"/>
+            <a:ext cx="1571914" cy="378210"/>
+          </a:xfrm>
+          <a:prstGeom prst="rect">
+            <a:avLst/>
+          </a:prstGeom>
+        </p:spPr>
+      </p:pic>
+      <p:pic>
+        <p:nvPicPr>
+          <p:cNvPr id="9" name="Picture 8">
+            <a:extLst>
+              <a:ext uri="{FF2B5EF4-FFF2-40B4-BE49-F238E27FC236}">
+                <a16:creationId xmlns:a16="http://schemas.microsoft.com/office/drawing/2014/main" id="{209A424D-98E7-A448-BFE7-80236051A126}"/>
+              </a:ext>
+            </a:extLst>
+          </p:cNvPr>
+          <p:cNvPicPr>
+            <a:picLocks noChangeAspect="1"/>
+          </p:cNvPicPr>
+          <p:nvPr/>
+        </p:nvPicPr>
+        <p:blipFill>
+          <a:blip r:embed="rId3"/>
+          <a:stretch>
+            <a:fillRect/>
+          </a:stretch>
+        </p:blipFill>
+        <p:spPr>
+          <a:xfrm>
+            <a:off x="1425428" y="576139"/>
+            <a:ext cx="4167976" cy="546100"/>
+          </a:xfrm>
+          <a:prstGeom prst="rect">
+            <a:avLst/>
+          </a:prstGeom>
+        </p:spPr>
+      </p:pic>
+      <p:pic>
+        <p:nvPicPr>
+          <p:cNvPr id="10" name="Picture 9">
+            <a:extLst>
+              <a:ext uri="{FF2B5EF4-FFF2-40B4-BE49-F238E27FC236}">
+                <a16:creationId xmlns:a16="http://schemas.microsoft.com/office/drawing/2014/main" id="{5FCB2768-C724-9C4F-A33D-D7DAF36D2EC7}"/>
+              </a:ext>
+            </a:extLst>
+          </p:cNvPr>
+          <p:cNvPicPr>
+            <a:picLocks noChangeAspect="1"/>
+          </p:cNvPicPr>
+          <p:nvPr/>
+        </p:nvPicPr>
+        <p:blipFill>
+          <a:blip r:embed="rId3"/>
+          <a:stretch>
+            <a:fillRect/>
+          </a:stretch>
+        </p:blipFill>
+        <p:spPr>
+          <a:xfrm>
+            <a:off x="4640123" y="1216793"/>
+            <a:ext cx="369622" cy="1925179"/>
+          </a:xfrm>
+          <a:prstGeom prst="rect">
+            <a:avLst/>
+          </a:prstGeom>
+        </p:spPr>
+      </p:pic>
+      <p:sp>
+        <p:nvSpPr>
+          <p:cNvPr id="7" name="Right Arrow 6">
+            <a:extLst>
+              <a:ext uri="{FF2B5EF4-FFF2-40B4-BE49-F238E27FC236}">
+                <a16:creationId xmlns:a16="http://schemas.microsoft.com/office/drawing/2014/main" id="{E47722BE-9B9A-1D4A-A142-9FDA6A845FE8}"/>
+              </a:ext>
+            </a:extLst>
+          </p:cNvPr>
+          <p:cNvSpPr/>
+          <p:nvPr/>
+        </p:nvSpPr>
+        <p:spPr>
+          <a:xfrm>
+            <a:off x="4873620" y="2135627"/>
+            <a:ext cx="854919" cy="437692"/>
+          </a:xfrm>
+          <a:prstGeom prst="rightArrow">
+            <a:avLst/>
+          </a:prstGeom>
+          <a:solidFill>
+            <a:srgbClr val="FFFF00"/>
+          </a:solidFill>
+        </p:spPr>
+        <p:style>
+          <a:lnRef idx="2">
+            <a:schemeClr val="accent1">
+              <a:shade val="50000"/>
+            </a:schemeClr>
+          </a:lnRef>
+          <a:fillRef idx="1">
+            <a:schemeClr val="accent1"/>
+          </a:fillRef>
+          <a:effectRef idx="0">
+            <a:schemeClr val="accent1"/>
+          </a:effectRef>
+          <a:fontRef idx="minor">
+            <a:schemeClr val="lt1"/>
+          </a:fontRef>
+        </p:style>
+        <p:txBody>
+          <a:bodyPr rtlCol="0" anchor="ctr"/>
+          <a:lstStyle/>
+          <a:p>
+            <a:pPr algn="ctr"/>
+            <a:r>
+              <a:rPr lang="en-US" sz="1600" dirty="0">
+                <a:solidFill>
+                  <a:schemeClr val="tx1"/>
+                </a:solidFill>
+              </a:rPr>
+              <a:t>#3</a:t>
+            </a:r>
+          </a:p>
+        </p:txBody>
+      </p:sp>
+      <p:pic>
+        <p:nvPicPr>
+          <p:cNvPr id="11" name="Picture 10">
+            <a:extLst>
+              <a:ext uri="{FF2B5EF4-FFF2-40B4-BE49-F238E27FC236}">
+                <a16:creationId xmlns:a16="http://schemas.microsoft.com/office/drawing/2014/main" id="{C67B1366-9451-244E-94DC-62DC3F16ACFA}"/>
+              </a:ext>
+            </a:extLst>
+          </p:cNvPr>
+          <p:cNvPicPr>
+            <a:picLocks noChangeAspect="1"/>
+          </p:cNvPicPr>
+          <p:nvPr/>
+        </p:nvPicPr>
+        <p:blipFill>
+          <a:blip r:embed="rId4"/>
+          <a:stretch>
+            <a:fillRect/>
+          </a:stretch>
+        </p:blipFill>
+        <p:spPr>
+          <a:xfrm>
+            <a:off x="5794464" y="1419722"/>
+            <a:ext cx="3986961" cy="1685715"/>
+          </a:xfrm>
+          <a:prstGeom prst="rect">
+            <a:avLst/>
+          </a:prstGeom>
+        </p:spPr>
+      </p:pic>
+      <p:pic>
+        <p:nvPicPr>
+          <p:cNvPr id="12" name="Picture 11">
+            <a:extLst>
+              <a:ext uri="{FF2B5EF4-FFF2-40B4-BE49-F238E27FC236}">
+                <a16:creationId xmlns:a16="http://schemas.microsoft.com/office/drawing/2014/main" id="{62A2BFCC-AA8B-8843-8DEF-5C6B3B61C4BD}"/>
+              </a:ext>
+            </a:extLst>
+          </p:cNvPr>
+          <p:cNvPicPr>
+            <a:picLocks noChangeAspect="1"/>
+          </p:cNvPicPr>
+          <p:nvPr/>
+        </p:nvPicPr>
+        <p:blipFill>
+          <a:blip r:embed="rId5"/>
+          <a:stretch>
+            <a:fillRect/>
+          </a:stretch>
+        </p:blipFill>
+        <p:spPr>
+          <a:xfrm>
+            <a:off x="1111549" y="3650607"/>
+            <a:ext cx="6010564" cy="1618867"/>
+          </a:xfrm>
+          <a:prstGeom prst="rect">
+            <a:avLst/>
+          </a:prstGeom>
+        </p:spPr>
+      </p:pic>
+    </p:spTree>
+    <p:extLst>
+      <p:ext uri="{BB962C8B-B14F-4D97-AF65-F5344CB8AC3E}">
+        <p14:creationId xmlns:p14="http://schemas.microsoft.com/office/powerpoint/2010/main" val="4104587075"/>
+      </p:ext>
+    </p:extLst>
+  </p:cSld>
+  <p:clrMapOvr>
+    <a:masterClrMapping/>
+  </p:clrMapOvr>
+</p:sld>
+</file>
+
 <file path=ppt/theme/theme1.xml><?xml version="1.0" encoding="utf-8"?>
 <a:theme xmlns:a="http://schemas.openxmlformats.org/drawingml/2006/main" name="Office Theme">
   <a:themeElements>

</xml_diff>